<commit_message>
Slides UFRJ e correções
Novos slides e correções
</commit_message>
<xml_diff>
--- a/Slides/sugestaoslideline.pptx
+++ b/Slides/sugestaoslideline.pptx
@@ -241,7 +241,7 @@
           <a:p>
             <a:fld id="{9788BEF5-D634-4783-BB1D-B313F140711D}" type="datetimeFigureOut">
               <a:rPr lang="pt-BR" smtClean="0"/>
-              <a:t>17/06/2021</a:t>
+              <a:t>16/07/2021</a:t>
             </a:fld>
             <a:endParaRPr lang="pt-BR"/>
           </a:p>
@@ -9590,9 +9590,7 @@
             <a:srgbClr val="6F7C91"/>
           </a:solidFill>
           <a:ln>
-            <a:solidFill>
-              <a:srgbClr val="38415C"/>
-            </a:solidFill>
+            <a:noFill/>
           </a:ln>
         </p:spPr>
         <p:style>
@@ -9969,9 +9967,7 @@
           </a:prstGeom>
           <a:noFill/>
           <a:ln>
-            <a:solidFill>
-              <a:srgbClr val="38415C"/>
-            </a:solidFill>
+            <a:noFill/>
           </a:ln>
         </p:spPr>
         <p:style>
@@ -11148,10 +11144,10 @@
       </p:sp>
       <p:sp>
         <p:nvSpPr>
-          <p:cNvPr id="6" name="Slide Number Placeholder 5">
+          <p:cNvPr id="2" name="Slide Number Placeholder 1">
             <a:extLst>
               <a:ext uri="{FF2B5EF4-FFF2-40B4-BE49-F238E27FC236}">
-                <a16:creationId xmlns:a16="http://schemas.microsoft.com/office/drawing/2014/main" id="{B6380016-2A1D-45D1-9119-E9D43A3AA829}"/>
+                <a16:creationId xmlns:a16="http://schemas.microsoft.com/office/drawing/2014/main" id="{3BC9F22C-510B-4A8D-AA7E-A407FB29E0FE}"/>
               </a:ext>
             </a:extLst>
           </p:cNvPr>
@@ -11172,10 +11168,7 @@
               <a:pPr/>
               <a:t>4</a:t>
             </a:fld>
-            <a:r>
-              <a:rPr lang="pt-BR" dirty="0"/>
-              <a:t>/</a:t>
-            </a:r>
+            <a:endParaRPr lang="pt-BR" sz="3200" dirty="0"/>
           </a:p>
         </p:txBody>
       </p:sp>
@@ -11791,10 +11784,10 @@
       </p:sp>
       <p:sp>
         <p:nvSpPr>
-          <p:cNvPr id="5" name="Slide Number Placeholder 4">
+          <p:cNvPr id="7" name="Slide Number Placeholder 6">
             <a:extLst>
               <a:ext uri="{FF2B5EF4-FFF2-40B4-BE49-F238E27FC236}">
-                <a16:creationId xmlns:a16="http://schemas.microsoft.com/office/drawing/2014/main" id="{B9CD2917-F205-4C16-B32C-83826DA4CA4F}"/>
+                <a16:creationId xmlns:a16="http://schemas.microsoft.com/office/drawing/2014/main" id="{637F8787-8413-4697-8CB9-6528F76964F0}"/>
               </a:ext>
             </a:extLst>
           </p:cNvPr>
@@ -11805,12 +11798,7 @@
             <p:ph type="sldNum" sz="quarter" idx="12"/>
           </p:nvPr>
         </p:nvSpPr>
-        <p:spPr>
-          <a:xfrm>
-            <a:off x="9326879" y="6356350"/>
-            <a:ext cx="2743200" cy="365125"/>
-          </a:xfrm>
-        </p:spPr>
+        <p:spPr/>
         <p:txBody>
           <a:bodyPr/>
           <a:lstStyle/>
@@ -11820,7 +11808,7 @@
               <a:pPr/>
               <a:t>8</a:t>
             </a:fld>
-            <a:endParaRPr lang="pt-BR" dirty="0"/>
+            <a:endParaRPr lang="pt-BR" sz="3200" dirty="0"/>
           </a:p>
         </p:txBody>
       </p:sp>

</xml_diff>